<commit_message>
creating presentation and video demo
</commit_message>
<xml_diff>
--- a/Apresentação.pptx
+++ b/Apresentação.pptx
@@ -15,6 +15,10 @@
     <p:sldId id="260" r:id="rId9"/>
     <p:sldId id="261" r:id="rId10"/>
     <p:sldId id="262" r:id="rId11"/>
+    <p:sldId id="263" r:id="rId12"/>
+    <p:sldId id="264" r:id="rId13"/>
+    <p:sldId id="265" r:id="rId14"/>
+    <p:sldId id="266" r:id="rId15"/>
   </p:sldIdLst>
   <p:sldSz cy="5143500" cx="9144000"/>
   <p:notesSz cx="6858000" cy="9144000"/>
@@ -467,6 +471,196 @@
 </p:notes>
 </file>
 
+<file path=ppt/notesSlides/notesSlide10.xml><?xml version="1.0" encoding="utf-8"?>
+<p:notes xmlns:a="http://schemas.openxmlformats.org/drawingml/2006/main" xmlns:r="http://schemas.openxmlformats.org/officeDocument/2006/relationships" xmlns:mc="http://schemas.openxmlformats.org/markup-compatibility/2006" xmlns:mv="urn:schemas-microsoft-com:mac:vml" xmlns:p="http://schemas.openxmlformats.org/presentationml/2006/main" xmlns:c="http://schemas.openxmlformats.org/drawingml/2006/chart" xmlns:dgm="http://schemas.openxmlformats.org/drawingml/2006/diagram" xmlns:o="urn:schemas-microsoft-com:office:office" xmlns:v="urn:schemas-microsoft-com:vml" xmlns:pvml="urn:schemas-microsoft-com:office:powerpoint" xmlns:com="http://schemas.openxmlformats.org/drawingml/2006/compatibility" xmlns:p14="http://schemas.microsoft.com/office/powerpoint/2010/main" showMasterPhAnim="0" showMasterSp="0">
+  <p:cSld>
+    <p:spTree>
+      <p:nvGrpSpPr>
+        <p:cNvPr id="117" name="Shape 117"/>
+        <p:cNvGrpSpPr/>
+        <p:nvPr/>
+      </p:nvGrpSpPr>
+      <p:grpSpPr>
+        <a:xfrm>
+          <a:off x="0" y="0"/>
+          <a:ext cx="0" cy="0"/>
+          <a:chOff x="0" y="0"/>
+          <a:chExt cx="0" cy="0"/>
+        </a:xfrm>
+      </p:grpSpPr>
+      <p:sp>
+        <p:nvSpPr>
+          <p:cNvPr id="118" name="Shape 118"/>
+          <p:cNvSpPr/>
+          <p:nvPr>
+            <p:ph idx="2" type="sldImg"/>
+          </p:nvPr>
+        </p:nvSpPr>
+        <p:spPr>
+          <a:xfrm>
+            <a:off x="381300" y="685800"/>
+            <a:ext cx="6096000" cy="3429000"/>
+          </a:xfrm>
+          <a:custGeom>
+            <a:pathLst>
+              <a:path extrusionOk="0" h="120000" w="120000">
+                <a:moveTo>
+                  <a:pt x="0" y="0"/>
+                </a:moveTo>
+                <a:lnTo>
+                  <a:pt x="120000" y="0"/>
+                </a:lnTo>
+                <a:lnTo>
+                  <a:pt x="120000" y="120000"/>
+                </a:lnTo>
+                <a:lnTo>
+                  <a:pt x="0" y="120000"/>
+                </a:lnTo>
+                <a:close/>
+              </a:path>
+            </a:pathLst>
+          </a:custGeom>
+        </p:spPr>
+      </p:sp>
+      <p:sp>
+        <p:nvSpPr>
+          <p:cNvPr id="119" name="Shape 119"/>
+          <p:cNvSpPr txBox="1"/>
+          <p:nvPr>
+            <p:ph idx="1" type="body"/>
+          </p:nvPr>
+        </p:nvSpPr>
+        <p:spPr>
+          <a:xfrm>
+            <a:off x="685800" y="4343400"/>
+            <a:ext cx="5486400" cy="4114800"/>
+          </a:xfrm>
+          <a:prstGeom prst="rect">
+            <a:avLst/>
+          </a:prstGeom>
+        </p:spPr>
+        <p:txBody>
+          <a:bodyPr anchorCtr="0" anchor="t" bIns="91425" lIns="91425" rIns="91425" tIns="91425">
+            <a:noAutofit/>
+          </a:bodyPr>
+          <a:lstStyle/>
+          <a:p>
+            <a:pPr lvl="0">
+              <a:spcBef>
+                <a:spcPts val="0"/>
+              </a:spcBef>
+              <a:buNone/>
+            </a:pPr>
+            <a:r>
+              <a:t/>
+            </a:r>
+            <a:endParaRPr/>
+          </a:p>
+        </p:txBody>
+      </p:sp>
+    </p:spTree>
+  </p:cSld>
+  <p:clrMapOvr>
+    <a:masterClrMapping/>
+  </p:clrMapOvr>
+</p:notes>
+</file>
+
+<file path=ppt/notesSlides/notesSlide11.xml><?xml version="1.0" encoding="utf-8"?>
+<p:notes xmlns:a="http://schemas.openxmlformats.org/drawingml/2006/main" xmlns:r="http://schemas.openxmlformats.org/officeDocument/2006/relationships" xmlns:mc="http://schemas.openxmlformats.org/markup-compatibility/2006" xmlns:mv="urn:schemas-microsoft-com:mac:vml" xmlns:p="http://schemas.openxmlformats.org/presentationml/2006/main" xmlns:c="http://schemas.openxmlformats.org/drawingml/2006/chart" xmlns:dgm="http://schemas.openxmlformats.org/drawingml/2006/diagram" xmlns:o="urn:schemas-microsoft-com:office:office" xmlns:v="urn:schemas-microsoft-com:vml" xmlns:pvml="urn:schemas-microsoft-com:office:powerpoint" xmlns:com="http://schemas.openxmlformats.org/drawingml/2006/compatibility" xmlns:p14="http://schemas.microsoft.com/office/powerpoint/2010/main" showMasterPhAnim="0" showMasterSp="0">
+  <p:cSld>
+    <p:spTree>
+      <p:nvGrpSpPr>
+        <p:cNvPr id="123" name="Shape 123"/>
+        <p:cNvGrpSpPr/>
+        <p:nvPr/>
+      </p:nvGrpSpPr>
+      <p:grpSpPr>
+        <a:xfrm>
+          <a:off x="0" y="0"/>
+          <a:ext cx="0" cy="0"/>
+          <a:chOff x="0" y="0"/>
+          <a:chExt cx="0" cy="0"/>
+        </a:xfrm>
+      </p:grpSpPr>
+      <p:sp>
+        <p:nvSpPr>
+          <p:cNvPr id="124" name="Shape 124"/>
+          <p:cNvSpPr/>
+          <p:nvPr>
+            <p:ph idx="2" type="sldImg"/>
+          </p:nvPr>
+        </p:nvSpPr>
+        <p:spPr>
+          <a:xfrm>
+            <a:off x="381300" y="685800"/>
+            <a:ext cx="6096000" cy="3429000"/>
+          </a:xfrm>
+          <a:custGeom>
+            <a:pathLst>
+              <a:path extrusionOk="0" h="120000" w="120000">
+                <a:moveTo>
+                  <a:pt x="0" y="0"/>
+                </a:moveTo>
+                <a:lnTo>
+                  <a:pt x="120000" y="0"/>
+                </a:lnTo>
+                <a:lnTo>
+                  <a:pt x="120000" y="120000"/>
+                </a:lnTo>
+                <a:lnTo>
+                  <a:pt x="0" y="120000"/>
+                </a:lnTo>
+                <a:close/>
+              </a:path>
+            </a:pathLst>
+          </a:custGeom>
+        </p:spPr>
+      </p:sp>
+      <p:sp>
+        <p:nvSpPr>
+          <p:cNvPr id="125" name="Shape 125"/>
+          <p:cNvSpPr txBox="1"/>
+          <p:nvPr>
+            <p:ph idx="1" type="body"/>
+          </p:nvPr>
+        </p:nvSpPr>
+        <p:spPr>
+          <a:xfrm>
+            <a:off x="685800" y="4343400"/>
+            <a:ext cx="5486400" cy="4114800"/>
+          </a:xfrm>
+          <a:prstGeom prst="rect">
+            <a:avLst/>
+          </a:prstGeom>
+        </p:spPr>
+        <p:txBody>
+          <a:bodyPr anchorCtr="0" anchor="t" bIns="91425" lIns="91425" rIns="91425" tIns="91425">
+            <a:noAutofit/>
+          </a:bodyPr>
+          <a:lstStyle/>
+          <a:p>
+            <a:pPr lvl="0">
+              <a:spcBef>
+                <a:spcPts val="0"/>
+              </a:spcBef>
+              <a:buNone/>
+            </a:pPr>
+            <a:r>
+              <a:t/>
+            </a:r>
+            <a:endParaRPr/>
+          </a:p>
+        </p:txBody>
+      </p:sp>
+    </p:spTree>
+  </p:cSld>
+  <p:clrMapOvr>
+    <a:masterClrMapping/>
+  </p:clrMapOvr>
+</p:notes>
+</file>
+
 <file path=ppt/notesSlides/notesSlide2.xml><?xml version="1.0" encoding="utf-8"?>
 <p:notes xmlns:a="http://schemas.openxmlformats.org/drawingml/2006/main" xmlns:r="http://schemas.openxmlformats.org/officeDocument/2006/relationships" xmlns:mc="http://schemas.openxmlformats.org/markup-compatibility/2006" xmlns:mv="urn:schemas-microsoft-com:mac:vml" xmlns:p="http://schemas.openxmlformats.org/presentationml/2006/main" xmlns:c="http://schemas.openxmlformats.org/drawingml/2006/chart" xmlns:dgm="http://schemas.openxmlformats.org/drawingml/2006/diagram" xmlns:o="urn:schemas-microsoft-com:office:office" xmlns:v="urn:schemas-microsoft-com:vml" xmlns:pvml="urn:schemas-microsoft-com:office:powerpoint" xmlns:com="http://schemas.openxmlformats.org/drawingml/2006/compatibility" xmlns:p14="http://schemas.microsoft.com/office/powerpoint/2010/main" showMasterPhAnim="0" showMasterSp="0">
   <p:cSld>
@@ -852,7 +1046,7 @@
   <p:cSld>
     <p:spTree>
       <p:nvGrpSpPr>
-        <p:cNvPr id="91" name="Shape 91"/>
+        <p:cNvPr id="92" name="Shape 92"/>
         <p:cNvGrpSpPr/>
         <p:nvPr/>
       </p:nvGrpSpPr>
@@ -866,7 +1060,7 @@
       </p:grpSpPr>
       <p:sp>
         <p:nvSpPr>
-          <p:cNvPr id="92" name="Shape 92"/>
+          <p:cNvPr id="93" name="Shape 93"/>
           <p:cNvSpPr/>
           <p:nvPr>
             <p:ph idx="2" type="sldImg"/>
@@ -900,7 +1094,7 @@
       </p:sp>
       <p:sp>
         <p:nvSpPr>
-          <p:cNvPr id="93" name="Shape 93"/>
+          <p:cNvPr id="94" name="Shape 94"/>
           <p:cNvSpPr txBox="1"/>
           <p:nvPr>
             <p:ph idx="1" type="body"/>
@@ -921,7 +1115,7 @@
           </a:bodyPr>
           <a:lstStyle/>
           <a:p>
-            <a:pPr lvl="0">
+            <a:pPr lvl="0" rtl="0">
               <a:spcBef>
                 <a:spcPts val="0"/>
               </a:spcBef>
@@ -947,7 +1141,7 @@
   <p:cSld>
     <p:spTree>
       <p:nvGrpSpPr>
-        <p:cNvPr id="97" name="Shape 97"/>
+        <p:cNvPr id="99" name="Shape 99"/>
         <p:cNvGrpSpPr/>
         <p:nvPr/>
       </p:nvGrpSpPr>
@@ -961,7 +1155,7 @@
       </p:grpSpPr>
       <p:sp>
         <p:nvSpPr>
-          <p:cNvPr id="98" name="Shape 98"/>
+          <p:cNvPr id="100" name="Shape 100"/>
           <p:cNvSpPr/>
           <p:nvPr>
             <p:ph idx="2" type="sldImg"/>
@@ -995,7 +1189,197 @@
       </p:sp>
       <p:sp>
         <p:nvSpPr>
-          <p:cNvPr id="99" name="Shape 99"/>
+          <p:cNvPr id="101" name="Shape 101"/>
+          <p:cNvSpPr txBox="1"/>
+          <p:nvPr>
+            <p:ph idx="1" type="body"/>
+          </p:nvPr>
+        </p:nvSpPr>
+        <p:spPr>
+          <a:xfrm>
+            <a:off x="685800" y="4343400"/>
+            <a:ext cx="5486400" cy="4114800"/>
+          </a:xfrm>
+          <a:prstGeom prst="rect">
+            <a:avLst/>
+          </a:prstGeom>
+        </p:spPr>
+        <p:txBody>
+          <a:bodyPr anchorCtr="0" anchor="t" bIns="91425" lIns="91425" rIns="91425" tIns="91425">
+            <a:noAutofit/>
+          </a:bodyPr>
+          <a:lstStyle/>
+          <a:p>
+            <a:pPr lvl="0">
+              <a:spcBef>
+                <a:spcPts val="0"/>
+              </a:spcBef>
+              <a:buNone/>
+            </a:pPr>
+            <a:r>
+              <a:t/>
+            </a:r>
+            <a:endParaRPr/>
+          </a:p>
+        </p:txBody>
+      </p:sp>
+    </p:spTree>
+  </p:cSld>
+  <p:clrMapOvr>
+    <a:masterClrMapping/>
+  </p:clrMapOvr>
+</p:notes>
+</file>
+
+<file path=ppt/notesSlides/notesSlide8.xml><?xml version="1.0" encoding="utf-8"?>
+<p:notes xmlns:a="http://schemas.openxmlformats.org/drawingml/2006/main" xmlns:r="http://schemas.openxmlformats.org/officeDocument/2006/relationships" xmlns:mc="http://schemas.openxmlformats.org/markup-compatibility/2006" xmlns:mv="urn:schemas-microsoft-com:mac:vml" xmlns:p="http://schemas.openxmlformats.org/presentationml/2006/main" xmlns:c="http://schemas.openxmlformats.org/drawingml/2006/chart" xmlns:dgm="http://schemas.openxmlformats.org/drawingml/2006/diagram" xmlns:o="urn:schemas-microsoft-com:office:office" xmlns:v="urn:schemas-microsoft-com:vml" xmlns:pvml="urn:schemas-microsoft-com:office:powerpoint" xmlns:com="http://schemas.openxmlformats.org/drawingml/2006/compatibility" xmlns:p14="http://schemas.microsoft.com/office/powerpoint/2010/main" showMasterPhAnim="0" showMasterSp="0">
+  <p:cSld>
+    <p:spTree>
+      <p:nvGrpSpPr>
+        <p:cNvPr id="105" name="Shape 105"/>
+        <p:cNvGrpSpPr/>
+        <p:nvPr/>
+      </p:nvGrpSpPr>
+      <p:grpSpPr>
+        <a:xfrm>
+          <a:off x="0" y="0"/>
+          <a:ext cx="0" cy="0"/>
+          <a:chOff x="0" y="0"/>
+          <a:chExt cx="0" cy="0"/>
+        </a:xfrm>
+      </p:grpSpPr>
+      <p:sp>
+        <p:nvSpPr>
+          <p:cNvPr id="106" name="Shape 106"/>
+          <p:cNvSpPr/>
+          <p:nvPr>
+            <p:ph idx="2" type="sldImg"/>
+          </p:nvPr>
+        </p:nvSpPr>
+        <p:spPr>
+          <a:xfrm>
+            <a:off x="381300" y="685800"/>
+            <a:ext cx="6096000" cy="3429000"/>
+          </a:xfrm>
+          <a:custGeom>
+            <a:pathLst>
+              <a:path extrusionOk="0" h="120000" w="120000">
+                <a:moveTo>
+                  <a:pt x="0" y="0"/>
+                </a:moveTo>
+                <a:lnTo>
+                  <a:pt x="120000" y="0"/>
+                </a:lnTo>
+                <a:lnTo>
+                  <a:pt x="120000" y="120000"/>
+                </a:lnTo>
+                <a:lnTo>
+                  <a:pt x="0" y="120000"/>
+                </a:lnTo>
+                <a:close/>
+              </a:path>
+            </a:pathLst>
+          </a:custGeom>
+        </p:spPr>
+      </p:sp>
+      <p:sp>
+        <p:nvSpPr>
+          <p:cNvPr id="107" name="Shape 107"/>
+          <p:cNvSpPr txBox="1"/>
+          <p:nvPr>
+            <p:ph idx="1" type="body"/>
+          </p:nvPr>
+        </p:nvSpPr>
+        <p:spPr>
+          <a:xfrm>
+            <a:off x="685800" y="4343400"/>
+            <a:ext cx="5486400" cy="4114800"/>
+          </a:xfrm>
+          <a:prstGeom prst="rect">
+            <a:avLst/>
+          </a:prstGeom>
+        </p:spPr>
+        <p:txBody>
+          <a:bodyPr anchorCtr="0" anchor="t" bIns="91425" lIns="91425" rIns="91425" tIns="91425">
+            <a:noAutofit/>
+          </a:bodyPr>
+          <a:lstStyle/>
+          <a:p>
+            <a:pPr lvl="0">
+              <a:spcBef>
+                <a:spcPts val="0"/>
+              </a:spcBef>
+              <a:buNone/>
+            </a:pPr>
+            <a:r>
+              <a:t/>
+            </a:r>
+            <a:endParaRPr/>
+          </a:p>
+        </p:txBody>
+      </p:sp>
+    </p:spTree>
+  </p:cSld>
+  <p:clrMapOvr>
+    <a:masterClrMapping/>
+  </p:clrMapOvr>
+</p:notes>
+</file>
+
+<file path=ppt/notesSlides/notesSlide9.xml><?xml version="1.0" encoding="utf-8"?>
+<p:notes xmlns:a="http://schemas.openxmlformats.org/drawingml/2006/main" xmlns:r="http://schemas.openxmlformats.org/officeDocument/2006/relationships" xmlns:mc="http://schemas.openxmlformats.org/markup-compatibility/2006" xmlns:mv="urn:schemas-microsoft-com:mac:vml" xmlns:p="http://schemas.openxmlformats.org/presentationml/2006/main" xmlns:c="http://schemas.openxmlformats.org/drawingml/2006/chart" xmlns:dgm="http://schemas.openxmlformats.org/drawingml/2006/diagram" xmlns:o="urn:schemas-microsoft-com:office:office" xmlns:v="urn:schemas-microsoft-com:vml" xmlns:pvml="urn:schemas-microsoft-com:office:powerpoint" xmlns:com="http://schemas.openxmlformats.org/drawingml/2006/compatibility" xmlns:p14="http://schemas.microsoft.com/office/powerpoint/2010/main" showMasterPhAnim="0" showMasterSp="0">
+  <p:cSld>
+    <p:spTree>
+      <p:nvGrpSpPr>
+        <p:cNvPr id="111" name="Shape 111"/>
+        <p:cNvGrpSpPr/>
+        <p:nvPr/>
+      </p:nvGrpSpPr>
+      <p:grpSpPr>
+        <a:xfrm>
+          <a:off x="0" y="0"/>
+          <a:ext cx="0" cy="0"/>
+          <a:chOff x="0" y="0"/>
+          <a:chExt cx="0" cy="0"/>
+        </a:xfrm>
+      </p:grpSpPr>
+      <p:sp>
+        <p:nvSpPr>
+          <p:cNvPr id="112" name="Shape 112"/>
+          <p:cNvSpPr/>
+          <p:nvPr>
+            <p:ph idx="2" type="sldImg"/>
+          </p:nvPr>
+        </p:nvSpPr>
+        <p:spPr>
+          <a:xfrm>
+            <a:off x="381300" y="685800"/>
+            <a:ext cx="6096000" cy="3429000"/>
+          </a:xfrm>
+          <a:custGeom>
+            <a:pathLst>
+              <a:path extrusionOk="0" h="120000" w="120000">
+                <a:moveTo>
+                  <a:pt x="0" y="0"/>
+                </a:moveTo>
+                <a:lnTo>
+                  <a:pt x="120000" y="0"/>
+                </a:lnTo>
+                <a:lnTo>
+                  <a:pt x="120000" y="120000"/>
+                </a:lnTo>
+                <a:lnTo>
+                  <a:pt x="0" y="120000"/>
+                </a:lnTo>
+                <a:close/>
+              </a:path>
+            </a:pathLst>
+          </a:custGeom>
+        </p:spPr>
+      </p:sp>
+      <p:sp>
+        <p:nvSpPr>
+          <p:cNvPr id="113" name="Shape 113"/>
           <p:cNvSpPr txBox="1"/>
           <p:nvPr>
             <p:ph idx="1" type="body"/>
@@ -4394,6 +4778,176 @@
 </p:sld>
 </file>
 
+<file path=ppt/slides/slide10.xml><?xml version="1.0" encoding="utf-8"?>
+<p:sld xmlns:a="http://schemas.openxmlformats.org/drawingml/2006/main" xmlns:r="http://schemas.openxmlformats.org/officeDocument/2006/relationships" xmlns:mc="http://schemas.openxmlformats.org/markup-compatibility/2006" xmlns:mv="urn:schemas-microsoft-com:mac:vml" xmlns:p="http://schemas.openxmlformats.org/presentationml/2006/main" xmlns:c="http://schemas.openxmlformats.org/drawingml/2006/chart" xmlns:dgm="http://schemas.openxmlformats.org/drawingml/2006/diagram" xmlns:o="urn:schemas-microsoft-com:office:office" xmlns:v="urn:schemas-microsoft-com:vml" xmlns:pvml="urn:schemas-microsoft-com:office:powerpoint" xmlns:com="http://schemas.openxmlformats.org/drawingml/2006/compatibility" xmlns:p14="http://schemas.microsoft.com/office/powerpoint/2010/main">
+  <p:cSld>
+    <p:spTree>
+      <p:nvGrpSpPr>
+        <p:cNvPr id="120" name="Shape 120"/>
+        <p:cNvGrpSpPr/>
+        <p:nvPr/>
+      </p:nvGrpSpPr>
+      <p:grpSpPr>
+        <a:xfrm>
+          <a:off x="0" y="0"/>
+          <a:ext cx="0" cy="0"/>
+          <a:chOff x="0" y="0"/>
+          <a:chExt cx="0" cy="0"/>
+        </a:xfrm>
+      </p:grpSpPr>
+      <p:sp>
+        <p:nvSpPr>
+          <p:cNvPr id="121" name="Shape 121"/>
+          <p:cNvSpPr txBox="1"/>
+          <p:nvPr>
+            <p:ph type="title"/>
+          </p:nvPr>
+        </p:nvSpPr>
+        <p:spPr>
+          <a:xfrm>
+            <a:off x="311700" y="445025"/>
+            <a:ext cx="8520600" cy="572700"/>
+          </a:xfrm>
+          <a:prstGeom prst="rect">
+            <a:avLst/>
+          </a:prstGeom>
+        </p:spPr>
+        <p:txBody>
+          <a:bodyPr anchorCtr="0" anchor="t" bIns="91425" lIns="91425" rIns="91425" tIns="91425">
+            <a:noAutofit/>
+          </a:bodyPr>
+          <a:lstStyle/>
+          <a:p>
+            <a:pPr lvl="0" algn="ctr">
+              <a:spcBef>
+                <a:spcPts val="0"/>
+              </a:spcBef>
+              <a:buNone/>
+            </a:pPr>
+            <a:r>
+              <a:rPr lang="en"/>
+              <a:t>SDL</a:t>
+            </a:r>
+          </a:p>
+        </p:txBody>
+      </p:sp>
+      <p:sp>
+        <p:nvSpPr>
+          <p:cNvPr id="122" name="Shape 122"/>
+          <p:cNvSpPr txBox="1"/>
+          <p:nvPr>
+            <p:ph idx="1" type="body"/>
+          </p:nvPr>
+        </p:nvSpPr>
+        <p:spPr>
+          <a:xfrm>
+            <a:off x="311700" y="1152475"/>
+            <a:ext cx="8520600" cy="3416400"/>
+          </a:xfrm>
+          <a:prstGeom prst="rect">
+            <a:avLst/>
+          </a:prstGeom>
+        </p:spPr>
+        <p:txBody>
+          <a:bodyPr anchorCtr="0" anchor="t" bIns="91425" lIns="91425" rIns="91425" tIns="91425">
+            <a:noAutofit/>
+          </a:bodyPr>
+          <a:lstStyle/>
+          <a:p>
+            <a:pPr lvl="0">
+              <a:spcBef>
+                <a:spcPts val="0"/>
+              </a:spcBef>
+              <a:buNone/>
+            </a:pPr>
+            <a:r>
+              <a:rPr lang="en"/>
+              <a:t>	O programa inicia seus componentes e de início é instanciada a comunicação com os arquivos. </a:t>
+            </a:r>
+          </a:p>
+          <a:p>
+            <a:pPr lvl="0">
+              <a:spcBef>
+                <a:spcPts val="0"/>
+              </a:spcBef>
+              <a:buNone/>
+            </a:pPr>
+            <a:r>
+              <a:rPr lang="en"/>
+              <a:t>	Ao entrar em uma sala, ele requisita a temperatura dos nós (enquanto a mensagem não chega, ele informa o valor de -1 para a temperatura), e automaticamente muda a informação assim que a resposta chega.</a:t>
+            </a:r>
+          </a:p>
+        </p:txBody>
+      </p:sp>
+    </p:spTree>
+  </p:cSld>
+  <p:clrMapOvr>
+    <a:masterClrMapping/>
+  </p:clrMapOvr>
+</p:sld>
+</file>
+
+<file path=ppt/slides/slide11.xml><?xml version="1.0" encoding="utf-8"?>
+<p:sld xmlns:a="http://schemas.openxmlformats.org/drawingml/2006/main" xmlns:r="http://schemas.openxmlformats.org/officeDocument/2006/relationships" xmlns:mc="http://schemas.openxmlformats.org/markup-compatibility/2006" xmlns:mv="urn:schemas-microsoft-com:mac:vml" xmlns:p="http://schemas.openxmlformats.org/presentationml/2006/main" xmlns:c="http://schemas.openxmlformats.org/drawingml/2006/chart" xmlns:dgm="http://schemas.openxmlformats.org/drawingml/2006/diagram" xmlns:o="urn:schemas-microsoft-com:office:office" xmlns:v="urn:schemas-microsoft-com:vml" xmlns:pvml="urn:schemas-microsoft-com:office:powerpoint" xmlns:com="http://schemas.openxmlformats.org/drawingml/2006/compatibility" xmlns:p14="http://schemas.microsoft.com/office/powerpoint/2010/main">
+  <p:cSld>
+    <p:spTree>
+      <p:nvGrpSpPr>
+        <p:cNvPr id="126" name="Shape 126"/>
+        <p:cNvGrpSpPr/>
+        <p:nvPr/>
+      </p:nvGrpSpPr>
+      <p:grpSpPr>
+        <a:xfrm>
+          <a:off x="0" y="0"/>
+          <a:ext cx="0" cy="0"/>
+          <a:chOff x="0" y="0"/>
+          <a:chExt cx="0" cy="0"/>
+        </a:xfrm>
+      </p:grpSpPr>
+      <p:sp>
+        <p:nvSpPr>
+          <p:cNvPr id="127" name="Shape 127"/>
+          <p:cNvSpPr txBox="1"/>
+          <p:nvPr>
+            <p:ph type="title"/>
+          </p:nvPr>
+        </p:nvSpPr>
+        <p:spPr>
+          <a:xfrm>
+            <a:off x="311700" y="2285400"/>
+            <a:ext cx="8520600" cy="572700"/>
+          </a:xfrm>
+          <a:prstGeom prst="rect">
+            <a:avLst/>
+          </a:prstGeom>
+        </p:spPr>
+        <p:txBody>
+          <a:bodyPr anchorCtr="0" anchor="t" bIns="91425" lIns="91425" rIns="91425" tIns="91425">
+            <a:noAutofit/>
+          </a:bodyPr>
+          <a:lstStyle/>
+          <a:p>
+            <a:pPr lvl="0" algn="ctr">
+              <a:spcBef>
+                <a:spcPts val="0"/>
+              </a:spcBef>
+              <a:buNone/>
+            </a:pPr>
+            <a:r>
+              <a:rPr lang="en"/>
+              <a:t>FIM</a:t>
+            </a:r>
+          </a:p>
+        </p:txBody>
+      </p:sp>
+    </p:spTree>
+  </p:cSld>
+  <p:clrMapOvr>
+    <a:masterClrMapping/>
+  </p:clrMapOvr>
+</p:sld>
+</file>
+
 <file path=ppt/slides/slide2.xml><?xml version="1.0" encoding="utf-8"?>
 <p:sld xmlns:a="http://schemas.openxmlformats.org/drawingml/2006/main" xmlns:r="http://schemas.openxmlformats.org/officeDocument/2006/relationships" xmlns:mc="http://schemas.openxmlformats.org/markup-compatibility/2006" xmlns:mv="urn:schemas-microsoft-com:mac:vml" xmlns:p="http://schemas.openxmlformats.org/presentationml/2006/main" xmlns:c="http://schemas.openxmlformats.org/drawingml/2006/chart" xmlns:dgm="http://schemas.openxmlformats.org/drawingml/2006/diagram" xmlns:o="urn:schemas-microsoft-com:office:office" xmlns:v="urn:schemas-microsoft-com:vml" xmlns:pvml="urn:schemas-microsoft-com:office:powerpoint" xmlns:com="http://schemas.openxmlformats.org/drawingml/2006/compatibility" xmlns:p14="http://schemas.microsoft.com/office/powerpoint/2010/main">
   <p:cSld>
@@ -5045,13 +5599,13 @@
           <p:cNvPr id="83" name="Shape 83"/>
           <p:cNvSpPr txBox="1"/>
           <p:nvPr>
-            <p:ph type="title"/>
-          </p:nvPr>
-        </p:nvSpPr>
-        <p:spPr>
-          <a:xfrm>
-            <a:off x="311700" y="297150"/>
-            <a:ext cx="8520600" cy="572700"/>
+            <p:ph idx="1" type="body"/>
+          </p:nvPr>
+        </p:nvSpPr>
+        <p:spPr>
+          <a:xfrm>
+            <a:off x="311700" y="1152475"/>
+            <a:ext cx="8520600" cy="3416400"/>
           </a:xfrm>
           <a:prstGeom prst="rect">
             <a:avLst/>
@@ -5063,7 +5617,7 @@
           </a:bodyPr>
           <a:lstStyle/>
           <a:p>
-            <a:pPr lvl="0" algn="ctr">
+            <a:pPr indent="457200" lvl="0" rtl="0">
               <a:spcBef>
                 <a:spcPts val="0"/>
               </a:spcBef>
@@ -5071,39 +5625,83 @@
             </a:pPr>
             <a:r>
               <a:rPr lang="en"/>
-              <a:t>GUI SDL</a:t>
+              <a:t>Os passos para a execução dos programas é a seguinte:</a:t>
+            </a:r>
+          </a:p>
+          <a:p>
+            <a:pPr indent="457200" lvl="0" rtl="0">
+              <a:spcBef>
+                <a:spcPts val="0"/>
+              </a:spcBef>
+              <a:buNone/>
+            </a:pPr>
+            <a:r>
+              <a:rPr lang="en"/>
+              <a:t>1º: Ligar a máquina virtual, abrir o TossimNet e usando o TossimControl transferir o código (rssfNodesTemperature.terra). Esperar terminar todo o processo.</a:t>
+            </a:r>
+          </a:p>
+          <a:p>
+            <a:pPr indent="457200" lvl="0" rtl="0">
+              <a:spcBef>
+                <a:spcPts val="0"/>
+              </a:spcBef>
+              <a:buNone/>
+            </a:pPr>
+            <a:r>
+              <a:rPr lang="en"/>
+              <a:t>2º: Executar script file_operator.lua. Esperar configuração de todos os nós ser concluída (luzes vermelhas se apagam).</a:t>
+            </a:r>
+          </a:p>
+          <a:p>
+            <a:pPr indent="457200" lvl="0">
+              <a:spcBef>
+                <a:spcPts val="0"/>
+              </a:spcBef>
+              <a:buNone/>
+            </a:pPr>
+            <a:r>
+              <a:rPr lang="en"/>
+              <a:t>3º: Executar o programa SDL main.ceu e fazer iterações com as salas.</a:t>
             </a:r>
           </a:p>
         </p:txBody>
       </p:sp>
-      <p:pic>
-        <p:nvPicPr>
-          <p:cNvPr descr="Screenshot from 2016-06-28 13:45:15.png" id="84" name="Shape 84"/>
-          <p:cNvPicPr preferRelativeResize="0"/>
-          <p:nvPr/>
-        </p:nvPicPr>
-        <p:blipFill>
-          <a:blip r:embed="rId3">
-            <a:alphaModFix/>
-          </a:blip>
-          <a:stretch>
-            <a:fillRect/>
-          </a:stretch>
-        </p:blipFill>
-        <p:spPr>
-          <a:xfrm>
-            <a:off x="2049802" y="941649"/>
-            <a:ext cx="5044400" cy="3960624"/>
-          </a:xfrm>
-          <a:prstGeom prst="rect">
-            <a:avLst/>
-          </a:prstGeom>
-          <a:noFill/>
-          <a:ln>
-            <a:noFill/>
-          </a:ln>
-        </p:spPr>
-      </p:pic>
+      <p:sp>
+        <p:nvSpPr>
+          <p:cNvPr id="84" name="Shape 84"/>
+          <p:cNvSpPr txBox="1"/>
+          <p:nvPr>
+            <p:ph type="title"/>
+          </p:nvPr>
+        </p:nvSpPr>
+        <p:spPr>
+          <a:xfrm>
+            <a:off x="311700" y="294150"/>
+            <a:ext cx="8520600" cy="572700"/>
+          </a:xfrm>
+          <a:prstGeom prst="rect">
+            <a:avLst/>
+          </a:prstGeom>
+        </p:spPr>
+        <p:txBody>
+          <a:bodyPr anchorCtr="0" anchor="t" bIns="91425" lIns="91425" rIns="91425" tIns="91425">
+            <a:noAutofit/>
+          </a:bodyPr>
+          <a:lstStyle/>
+          <a:p>
+            <a:pPr lvl="0" rtl="0" algn="ctr">
+              <a:spcBef>
+                <a:spcPts val="0"/>
+              </a:spcBef>
+              <a:buNone/>
+            </a:pPr>
+            <a:r>
+              <a:rPr lang="en" sz="3000"/>
+              <a:t>Ideia geral</a:t>
+            </a:r>
+          </a:p>
+        </p:txBody>
+      </p:sp>
     </p:spTree>
   </p:cSld>
   <p:clrMapOvr>
@@ -5139,7 +5737,7 @@
         </p:nvSpPr>
         <p:spPr>
           <a:xfrm>
-            <a:off x="311700" y="445025"/>
+            <a:off x="311700" y="297150"/>
             <a:ext cx="8520600" cy="572700"/>
           </a:xfrm>
           <a:prstGeom prst="rect">
@@ -5160,6 +5758,292 @@
             </a:pPr>
             <a:r>
               <a:rPr lang="en"/>
+              <a:t>GUI SDL</a:t>
+            </a:r>
+          </a:p>
+        </p:txBody>
+      </p:sp>
+      <p:pic>
+        <p:nvPicPr>
+          <p:cNvPr descr="Screenshot from 2016-07-04 23:03:10.png" id="90" name="Shape 90"/>
+          <p:cNvPicPr preferRelativeResize="0"/>
+          <p:nvPr/>
+        </p:nvPicPr>
+        <p:blipFill>
+          <a:blip r:embed="rId3">
+            <a:alphaModFix/>
+          </a:blip>
+          <a:stretch>
+            <a:fillRect/>
+          </a:stretch>
+        </p:blipFill>
+        <p:spPr>
+          <a:xfrm>
+            <a:off x="3961802" y="869850"/>
+            <a:ext cx="4870425" cy="3818900"/>
+          </a:xfrm>
+          <a:prstGeom prst="rect">
+            <a:avLst/>
+          </a:prstGeom>
+          <a:noFill/>
+          <a:ln>
+            <a:noFill/>
+          </a:ln>
+        </p:spPr>
+      </p:pic>
+      <p:sp>
+        <p:nvSpPr>
+          <p:cNvPr id="91" name="Shape 91"/>
+          <p:cNvSpPr txBox="1"/>
+          <p:nvPr/>
+        </p:nvSpPr>
+        <p:spPr>
+          <a:xfrm>
+            <a:off x="311700" y="2272250"/>
+            <a:ext cx="3650100" cy="709200"/>
+          </a:xfrm>
+          <a:prstGeom prst="rect">
+            <a:avLst/>
+          </a:prstGeom>
+          <a:noFill/>
+          <a:ln>
+            <a:noFill/>
+          </a:ln>
+        </p:spPr>
+        <p:txBody>
+          <a:bodyPr anchorCtr="0" anchor="ctr" bIns="91425" lIns="91425" rIns="91425" tIns="91425">
+            <a:noAutofit/>
+          </a:bodyPr>
+          <a:lstStyle/>
+          <a:p>
+            <a:pPr lvl="0" rtl="0" algn="ctr">
+              <a:spcBef>
+                <a:spcPts val="0"/>
+              </a:spcBef>
+              <a:buNone/>
+            </a:pPr>
+            <a:r>
+              <a:rPr lang="en">
+                <a:solidFill>
+                  <a:srgbClr val="EFEFEF"/>
+                </a:solidFill>
+              </a:rPr>
+              <a:t>Area e</a:t>
+            </a:r>
+            <a:r>
+              <a:rPr lang="en">
+                <a:solidFill>
+                  <a:srgbClr val="EFEFEF"/>
+                </a:solidFill>
+              </a:rPr>
+              <a:t>xterior </a:t>
+            </a:r>
+          </a:p>
+          <a:p>
+            <a:pPr lvl="0" algn="ctr">
+              <a:spcBef>
+                <a:spcPts val="0"/>
+              </a:spcBef>
+              <a:buNone/>
+            </a:pPr>
+            <a:r>
+              <a:rPr lang="en">
+                <a:solidFill>
+                  <a:srgbClr val="EFEFEF"/>
+                </a:solidFill>
+              </a:rPr>
+              <a:t>(corredor com portas das salas)</a:t>
+            </a:r>
+          </a:p>
+        </p:txBody>
+      </p:sp>
+    </p:spTree>
+  </p:cSld>
+  <p:clrMapOvr>
+    <a:masterClrMapping/>
+  </p:clrMapOvr>
+</p:sld>
+</file>
+
+<file path=ppt/slides/slide6.xml><?xml version="1.0" encoding="utf-8"?>
+<p:sld xmlns:a="http://schemas.openxmlformats.org/drawingml/2006/main" xmlns:r="http://schemas.openxmlformats.org/officeDocument/2006/relationships" xmlns:mc="http://schemas.openxmlformats.org/markup-compatibility/2006" xmlns:mv="urn:schemas-microsoft-com:mac:vml" xmlns:p="http://schemas.openxmlformats.org/presentationml/2006/main" xmlns:c="http://schemas.openxmlformats.org/drawingml/2006/chart" xmlns:dgm="http://schemas.openxmlformats.org/drawingml/2006/diagram" xmlns:o="urn:schemas-microsoft-com:office:office" xmlns:v="urn:schemas-microsoft-com:vml" xmlns:pvml="urn:schemas-microsoft-com:office:powerpoint" xmlns:com="http://schemas.openxmlformats.org/drawingml/2006/compatibility" xmlns:p14="http://schemas.microsoft.com/office/powerpoint/2010/main">
+  <p:cSld>
+    <p:spTree>
+      <p:nvGrpSpPr>
+        <p:cNvPr id="95" name="Shape 95"/>
+        <p:cNvGrpSpPr/>
+        <p:nvPr/>
+      </p:nvGrpSpPr>
+      <p:grpSpPr>
+        <a:xfrm>
+          <a:off x="0" y="0"/>
+          <a:ext cx="0" cy="0"/>
+          <a:chOff x="0" y="0"/>
+          <a:chExt cx="0" cy="0"/>
+        </a:xfrm>
+      </p:grpSpPr>
+      <p:sp>
+        <p:nvSpPr>
+          <p:cNvPr id="96" name="Shape 96"/>
+          <p:cNvSpPr txBox="1"/>
+          <p:nvPr>
+            <p:ph type="title"/>
+          </p:nvPr>
+        </p:nvSpPr>
+        <p:spPr>
+          <a:xfrm>
+            <a:off x="311700" y="297150"/>
+            <a:ext cx="8520600" cy="572700"/>
+          </a:xfrm>
+          <a:prstGeom prst="rect">
+            <a:avLst/>
+          </a:prstGeom>
+        </p:spPr>
+        <p:txBody>
+          <a:bodyPr anchorCtr="0" anchor="t" bIns="91425" lIns="91425" rIns="91425" tIns="91425">
+            <a:noAutofit/>
+          </a:bodyPr>
+          <a:lstStyle/>
+          <a:p>
+            <a:pPr lvl="0" rtl="0" algn="ctr">
+              <a:spcBef>
+                <a:spcPts val="0"/>
+              </a:spcBef>
+              <a:buNone/>
+            </a:pPr>
+            <a:r>
+              <a:rPr lang="en"/>
+              <a:t>GUI SDL</a:t>
+            </a:r>
+          </a:p>
+        </p:txBody>
+      </p:sp>
+      <p:sp>
+        <p:nvSpPr>
+          <p:cNvPr id="97" name="Shape 97"/>
+          <p:cNvSpPr txBox="1"/>
+          <p:nvPr/>
+        </p:nvSpPr>
+        <p:spPr>
+          <a:xfrm>
+            <a:off x="311700" y="2272250"/>
+            <a:ext cx="3650100" cy="709200"/>
+          </a:xfrm>
+          <a:prstGeom prst="rect">
+            <a:avLst/>
+          </a:prstGeom>
+          <a:noFill/>
+          <a:ln>
+            <a:noFill/>
+          </a:ln>
+        </p:spPr>
+        <p:txBody>
+          <a:bodyPr anchorCtr="0" anchor="ctr" bIns="91425" lIns="91425" rIns="91425" tIns="91425">
+            <a:noAutofit/>
+          </a:bodyPr>
+          <a:lstStyle/>
+          <a:p>
+            <a:pPr lvl="0" rtl="0" algn="ctr">
+              <a:spcBef>
+                <a:spcPts val="0"/>
+              </a:spcBef>
+              <a:buNone/>
+            </a:pPr>
+            <a:r>
+              <a:rPr lang="en">
+                <a:solidFill>
+                  <a:srgbClr val="EFEFEF"/>
+                </a:solidFill>
+              </a:rPr>
+              <a:t>Area interior - possui as informações da temperatura e respectiva sala e professor.</a:t>
+            </a:r>
+          </a:p>
+        </p:txBody>
+      </p:sp>
+      <p:pic>
+        <p:nvPicPr>
+          <p:cNvPr descr="Screenshot from 2016-07-04 23:03:59.png" id="98" name="Shape 98"/>
+          <p:cNvPicPr preferRelativeResize="0"/>
+          <p:nvPr/>
+        </p:nvPicPr>
+        <p:blipFill>
+          <a:blip r:embed="rId3">
+            <a:alphaModFix/>
+          </a:blip>
+          <a:stretch>
+            <a:fillRect/>
+          </a:stretch>
+        </p:blipFill>
+        <p:spPr>
+          <a:xfrm>
+            <a:off x="3961799" y="869841"/>
+            <a:ext cx="4870499" cy="3818958"/>
+          </a:xfrm>
+          <a:prstGeom prst="rect">
+            <a:avLst/>
+          </a:prstGeom>
+          <a:noFill/>
+          <a:ln>
+            <a:noFill/>
+          </a:ln>
+        </p:spPr>
+      </p:pic>
+    </p:spTree>
+  </p:cSld>
+  <p:clrMapOvr>
+    <a:masterClrMapping/>
+  </p:clrMapOvr>
+</p:sld>
+</file>
+
+<file path=ppt/slides/slide7.xml><?xml version="1.0" encoding="utf-8"?>
+<p:sld xmlns:a="http://schemas.openxmlformats.org/drawingml/2006/main" xmlns:r="http://schemas.openxmlformats.org/officeDocument/2006/relationships" xmlns:mc="http://schemas.openxmlformats.org/markup-compatibility/2006" xmlns:mv="urn:schemas-microsoft-com:mac:vml" xmlns:p="http://schemas.openxmlformats.org/presentationml/2006/main" xmlns:c="http://schemas.openxmlformats.org/drawingml/2006/chart" xmlns:dgm="http://schemas.openxmlformats.org/drawingml/2006/diagram" xmlns:o="urn:schemas-microsoft-com:office:office" xmlns:v="urn:schemas-microsoft-com:vml" xmlns:pvml="urn:schemas-microsoft-com:office:powerpoint" xmlns:com="http://schemas.openxmlformats.org/drawingml/2006/compatibility" xmlns:p14="http://schemas.microsoft.com/office/powerpoint/2010/main">
+  <p:cSld>
+    <p:spTree>
+      <p:nvGrpSpPr>
+        <p:cNvPr id="102" name="Shape 102"/>
+        <p:cNvGrpSpPr/>
+        <p:nvPr/>
+      </p:nvGrpSpPr>
+      <p:grpSpPr>
+        <a:xfrm>
+          <a:off x="0" y="0"/>
+          <a:ext cx="0" cy="0"/>
+          <a:chOff x="0" y="0"/>
+          <a:chExt cx="0" cy="0"/>
+        </a:xfrm>
+      </p:grpSpPr>
+      <p:sp>
+        <p:nvSpPr>
+          <p:cNvPr id="103" name="Shape 103"/>
+          <p:cNvSpPr txBox="1"/>
+          <p:nvPr>
+            <p:ph type="title"/>
+          </p:nvPr>
+        </p:nvSpPr>
+        <p:spPr>
+          <a:xfrm>
+            <a:off x="311700" y="183375"/>
+            <a:ext cx="8520600" cy="572700"/>
+          </a:xfrm>
+          <a:prstGeom prst="rect">
+            <a:avLst/>
+          </a:prstGeom>
+        </p:spPr>
+        <p:txBody>
+          <a:bodyPr anchorCtr="0" anchor="t" bIns="91425" lIns="91425" rIns="91425" tIns="91425">
+            <a:noAutofit/>
+          </a:bodyPr>
+          <a:lstStyle/>
+          <a:p>
+            <a:pPr lvl="0" algn="ctr">
+              <a:spcBef>
+                <a:spcPts val="0"/>
+              </a:spcBef>
+              <a:buNone/>
+            </a:pPr>
+            <a:r>
+              <a:rPr lang="en"/>
               <a:t>Arquivos</a:t>
             </a:r>
           </a:p>
@@ -5167,7 +6051,7 @@
       </p:sp>
       <p:sp>
         <p:nvSpPr>
-          <p:cNvPr id="90" name="Shape 90"/>
+          <p:cNvPr id="104" name="Shape 104"/>
           <p:cNvSpPr txBox="1"/>
           <p:nvPr>
             <p:ph idx="1" type="body"/>
@@ -5175,8 +6059,8 @@
         </p:nvSpPr>
         <p:spPr>
           <a:xfrm>
-            <a:off x="311700" y="1152475"/>
-            <a:ext cx="8520600" cy="3416400"/>
+            <a:off x="311700" y="863550"/>
+            <a:ext cx="8520600" cy="4032000"/>
           </a:xfrm>
           <a:prstGeom prst="rect">
             <a:avLst/>
@@ -5200,7 +6084,7 @@
                   <a:srgbClr val="FFFFFF"/>
                 </a:solidFill>
               </a:rPr>
-              <a:t>Configuração</a:t>
+              <a:t>Configuração das salas</a:t>
             </a:r>
             <a:r>
               <a:rPr lang="en" sz="2000">
@@ -5272,7 +6156,7 @@
             </a:pPr>
             <a:r>
               <a:rPr lang="en" sz="2000"/>
-              <a:t>Funciona como o arquivo de exemplo disponibilizado.</a:t>
+              <a:t>O programa SDL, ao entrar em uma sala, escreve o nó pai (da rede) no arquivo de requisição, e cria uma instância de um arquivo lock. Enquanto esse arquivo existir, o SDL espera até o script lua receber uma mensagem, escreve no arquivo de reposta e apaga o arquivo lock.</a:t>
             </a:r>
           </a:p>
           <a:p>
@@ -5301,12 +6185,12 @@
 </p:sld>
 </file>
 
-<file path=ppt/slides/slide6.xml><?xml version="1.0" encoding="utf-8"?>
+<file path=ppt/slides/slide8.xml><?xml version="1.0" encoding="utf-8"?>
 <p:sld xmlns:a="http://schemas.openxmlformats.org/drawingml/2006/main" xmlns:r="http://schemas.openxmlformats.org/officeDocument/2006/relationships" xmlns:mc="http://schemas.openxmlformats.org/markup-compatibility/2006" xmlns:mv="urn:schemas-microsoft-com:mac:vml" xmlns:p="http://schemas.openxmlformats.org/presentationml/2006/main" xmlns:c="http://schemas.openxmlformats.org/drawingml/2006/chart" xmlns:dgm="http://schemas.openxmlformats.org/drawingml/2006/diagram" xmlns:o="urn:schemas-microsoft-com:office:office" xmlns:v="urn:schemas-microsoft-com:vml" xmlns:pvml="urn:schemas-microsoft-com:office:powerpoint" xmlns:com="http://schemas.openxmlformats.org/drawingml/2006/compatibility" xmlns:p14="http://schemas.microsoft.com/office/powerpoint/2010/main">
   <p:cSld>
     <p:spTree>
       <p:nvGrpSpPr>
-        <p:cNvPr id="94" name="Shape 94"/>
+        <p:cNvPr id="108" name="Shape 108"/>
         <p:cNvGrpSpPr/>
         <p:nvPr/>
       </p:nvGrpSpPr>
@@ -5320,7 +6204,7 @@
       </p:grpSpPr>
       <p:sp>
         <p:nvSpPr>
-          <p:cNvPr id="95" name="Shape 95"/>
+          <p:cNvPr id="109" name="Shape 109"/>
           <p:cNvSpPr txBox="1"/>
           <p:nvPr>
             <p:ph type="title"/>
@@ -5356,7 +6240,7 @@
       </p:sp>
       <p:sp>
         <p:nvSpPr>
-          <p:cNvPr id="96" name="Shape 96"/>
+          <p:cNvPr id="110" name="Shape 110"/>
           <p:cNvSpPr txBox="1"/>
           <p:nvPr>
             <p:ph idx="1" type="body"/>
@@ -5385,7 +6269,7 @@
             </a:pPr>
             <a:r>
               <a:rPr lang="en" sz="2000"/>
-              <a:t>A primeira coisa a se fazer, é montar a árvore de nós, a modo de mantê-los todos ligados, e pela lógica do programa.</a:t>
+              <a:t>A primeira coisa a se fazer, é montar a árvore de nós, a modo de mantê-los todos ligados, e pela lógica de envios de mensagem.</a:t>
             </a:r>
           </a:p>
           <a:p>
@@ -5397,7 +6281,7 @@
             </a:pPr>
             <a:r>
               <a:rPr lang="en" sz="2000"/>
-              <a:t>	Após isto, a rede aguarda pela configuração de sensores (que vem do arquivo de configuração) e são ajustados os filhos que compõe este nó pai. Esta definição é feita na ordenação dos nós pelo arquivo de configuração. O primeiro é sempre o pai.</a:t>
+              <a:t>	Após isto, a rede aguarda pela configuração de sensores (que vem do arquivo de configuração, emitidos pelo script lua) e são ajustados os filhos que compõem este nó pai. Esta definição é feita na ordenação dos nós pelo arquivo de configuração. O primeiro nó da linha é sempre o pai.</a:t>
             </a:r>
           </a:p>
         </p:txBody>
@@ -5410,12 +6294,12 @@
 </p:sld>
 </file>
 
-<file path=ppt/slides/slide7.xml><?xml version="1.0" encoding="utf-8"?>
+<file path=ppt/slides/slide9.xml><?xml version="1.0" encoding="utf-8"?>
 <p:sld xmlns:a="http://schemas.openxmlformats.org/drawingml/2006/main" xmlns:r="http://schemas.openxmlformats.org/officeDocument/2006/relationships" xmlns:mc="http://schemas.openxmlformats.org/markup-compatibility/2006" xmlns:mv="urn:schemas-microsoft-com:mac:vml" xmlns:p="http://schemas.openxmlformats.org/presentationml/2006/main" xmlns:c="http://schemas.openxmlformats.org/drawingml/2006/chart" xmlns:dgm="http://schemas.openxmlformats.org/drawingml/2006/diagram" xmlns:o="urn:schemas-microsoft-com:office:office" xmlns:v="urn:schemas-microsoft-com:vml" xmlns:pvml="urn:schemas-microsoft-com:office:powerpoint" xmlns:com="http://schemas.openxmlformats.org/drawingml/2006/compatibility" xmlns:p14="http://schemas.microsoft.com/office/powerpoint/2010/main">
   <p:cSld>
     <p:spTree>
       <p:nvGrpSpPr>
-        <p:cNvPr id="100" name="Shape 100"/>
+        <p:cNvPr id="114" name="Shape 114"/>
         <p:cNvGrpSpPr/>
         <p:nvPr/>
       </p:nvGrpSpPr>
@@ -5429,7 +6313,7 @@
       </p:grpSpPr>
       <p:sp>
         <p:nvSpPr>
-          <p:cNvPr id="101" name="Shape 101"/>
+          <p:cNvPr id="115" name="Shape 115"/>
           <p:cNvSpPr txBox="1"/>
           <p:nvPr>
             <p:ph type="title"/>
@@ -5465,7 +6349,7 @@
       </p:sp>
       <p:sp>
         <p:nvSpPr>
-          <p:cNvPr id="102" name="Shape 102"/>
+          <p:cNvPr id="116" name="Shape 116"/>
           <p:cNvSpPr txBox="1"/>
           <p:nvPr>
             <p:ph idx="1" type="body"/>
@@ -5506,7 +6390,7 @@
             </a:pPr>
             <a:r>
               <a:rPr lang="en" sz="2000"/>
-              <a:t>	Chegando uma requisição, automaticamente é enviado para os respectivos filhos a mesma requisição. Os valores são recebidos e a média é retirada, onde ela segue pela mensagem de resposta da primeira requisição. </a:t>
+              <a:t>	Chegando uma requisição, automaticamente é enviado para os respectivos filhos a mesma requisição. Os valores são recebidos e a média é retirada, onde ela segue pela mensagem de resposta da requisição. </a:t>
             </a:r>
           </a:p>
         </p:txBody>
@@ -5520,6 +6404,285 @@
 </file>
 
 <file path=ppt/theme/theme1.xml><?xml version="1.0" encoding="utf-8"?>
+<a:theme xmlns:a="http://schemas.openxmlformats.org/drawingml/2006/main" xmlns:r="http://schemas.openxmlformats.org/officeDocument/2006/relationships" name="simple-dark-2">
+  <a:themeElements>
+    <a:clrScheme name="Simple Dark">
+      <a:dk1>
+        <a:srgbClr val="FFFFFF"/>
+      </a:dk1>
+      <a:lt1>
+        <a:srgbClr val="212121"/>
+      </a:lt1>
+      <a:dk2>
+        <a:srgbClr val="303030"/>
+      </a:dk2>
+      <a:lt2>
+        <a:srgbClr val="ADADAD"/>
+      </a:lt2>
+      <a:accent1>
+        <a:srgbClr val="009688"/>
+      </a:accent1>
+      <a:accent2>
+        <a:srgbClr val="EEEEEE"/>
+      </a:accent2>
+      <a:accent3>
+        <a:srgbClr val="78909C"/>
+      </a:accent3>
+      <a:accent4>
+        <a:srgbClr val="FFAB40"/>
+      </a:accent4>
+      <a:accent5>
+        <a:srgbClr val="4DD0E1"/>
+      </a:accent5>
+      <a:accent6>
+        <a:srgbClr val="EEFF41"/>
+      </a:accent6>
+      <a:hlink>
+        <a:srgbClr val="4DD0E1"/>
+      </a:hlink>
+      <a:folHlink>
+        <a:srgbClr val="4DD0E1"/>
+      </a:folHlink>
+    </a:clrScheme>
+    <a:fontScheme name="Office">
+      <a:majorFont>
+        <a:latin typeface="Arial"/>
+        <a:ea typeface=""/>
+        <a:cs typeface=""/>
+        <a:font script="Jpan" typeface="ＭＳ Ｐゴシック"/>
+        <a:font script="Hang" typeface="맑은 고딕"/>
+        <a:font script="Hans" typeface="宋体"/>
+        <a:font script="Hant" typeface="新細明體"/>
+        <a:font script="Arab" typeface="Times New Roman"/>
+        <a:font script="Hebr" typeface="Times New Roman"/>
+        <a:font script="Thai" typeface="Angsana New"/>
+        <a:font script="Ethi" typeface="Nyala"/>
+        <a:font script="Beng" typeface="Vrinda"/>
+        <a:font script="Gujr" typeface="Shruti"/>
+        <a:font script="Khmr" typeface="MoolBoran"/>
+        <a:font script="Knda" typeface="Tunga"/>
+        <a:font script="Guru" typeface="Raavi"/>
+        <a:font script="Cans" typeface="Euphemia"/>
+        <a:font script="Cher" typeface="Plantagenet Cherokee"/>
+        <a:font script="Yiii" typeface="Microsoft Yi Baiti"/>
+        <a:font script="Tibt" typeface="Microsoft Himalaya"/>
+        <a:font script="Thaa" typeface="MV Boli"/>
+        <a:font script="Deva" typeface="Mangal"/>
+        <a:font script="Telu" typeface="Gautami"/>
+        <a:font script="Taml" typeface="Latha"/>
+        <a:font script="Syrc" typeface="Estrangelo Edessa"/>
+        <a:font script="Orya" typeface="Kalinga"/>
+        <a:font script="Mlym" typeface="Kartika"/>
+        <a:font script="Laoo" typeface="DokChampa"/>
+        <a:font script="Sinh" typeface="Iskoola Pota"/>
+        <a:font script="Mong" typeface="Mongolian Baiti"/>
+        <a:font script="Viet" typeface="Times New Roman"/>
+        <a:font script="Uigh" typeface="Microsoft Uighur"/>
+        <a:font script="Geor" typeface="Sylfaen"/>
+      </a:majorFont>
+      <a:minorFont>
+        <a:latin typeface="Arial"/>
+        <a:ea typeface=""/>
+        <a:cs typeface=""/>
+        <a:font script="Jpan" typeface="ＭＳ Ｐゴシック"/>
+        <a:font script="Hang" typeface="맑은 고딕"/>
+        <a:font script="Hans" typeface="宋体"/>
+        <a:font script="Hant" typeface="新細明體"/>
+        <a:font script="Arab" typeface="Arial"/>
+        <a:font script="Hebr" typeface="Arial"/>
+        <a:font script="Thai" typeface="Cordia New"/>
+        <a:font script="Ethi" typeface="Nyala"/>
+        <a:font script="Beng" typeface="Vrinda"/>
+        <a:font script="Gujr" typeface="Shruti"/>
+        <a:font script="Khmr" typeface="DaunPenh"/>
+        <a:font script="Knda" typeface="Tunga"/>
+        <a:font script="Guru" typeface="Raavi"/>
+        <a:font script="Cans" typeface="Euphemia"/>
+        <a:font script="Cher" typeface="Plantagenet Cherokee"/>
+        <a:font script="Yiii" typeface="Microsoft Yi Baiti"/>
+        <a:font script="Tibt" typeface="Microsoft Himalaya"/>
+        <a:font script="Thaa" typeface="MV Boli"/>
+        <a:font script="Deva" typeface="Mangal"/>
+        <a:font script="Telu" typeface="Gautami"/>
+        <a:font script="Taml" typeface="Latha"/>
+        <a:font script="Syrc" typeface="Estrangelo Edessa"/>
+        <a:font script="Orya" typeface="Kalinga"/>
+        <a:font script="Mlym" typeface="Kartika"/>
+        <a:font script="Laoo" typeface="DokChampa"/>
+        <a:font script="Sinh" typeface="Iskoola Pota"/>
+        <a:font script="Mong" typeface="Mongolian Baiti"/>
+        <a:font script="Viet" typeface="Arial"/>
+        <a:font script="Uigh" typeface="Microsoft Uighur"/>
+        <a:font script="Geor" typeface="Sylfaen"/>
+      </a:minorFont>
+    </a:fontScheme>
+    <a:fmtScheme name="Office">
+      <a:fillStyleLst>
+        <a:solidFill>
+          <a:schemeClr val="phClr"/>
+        </a:solidFill>
+        <a:gradFill rotWithShape="1">
+          <a:gsLst>
+            <a:gs pos="0">
+              <a:schemeClr val="phClr">
+                <a:tint val="50000"/>
+                <a:satMod val="300000"/>
+              </a:schemeClr>
+            </a:gs>
+            <a:gs pos="35000">
+              <a:schemeClr val="phClr">
+                <a:tint val="37000"/>
+                <a:satMod val="300000"/>
+              </a:schemeClr>
+            </a:gs>
+            <a:gs pos="100000">
+              <a:schemeClr val="phClr">
+                <a:tint val="15000"/>
+                <a:satMod val="350000"/>
+              </a:schemeClr>
+            </a:gs>
+          </a:gsLst>
+          <a:lin ang="16200000" scaled="1"/>
+        </a:gradFill>
+        <a:gradFill rotWithShape="1">
+          <a:gsLst>
+            <a:gs pos="0">
+              <a:schemeClr val="phClr">
+                <a:tint val="100000"/>
+                <a:shade val="100000"/>
+                <a:satMod val="130000"/>
+              </a:schemeClr>
+            </a:gs>
+            <a:gs pos="100000">
+              <a:schemeClr val="phClr">
+                <a:tint val="50000"/>
+                <a:shade val="100000"/>
+                <a:satMod val="350000"/>
+              </a:schemeClr>
+            </a:gs>
+          </a:gsLst>
+          <a:lin ang="16200000" scaled="0"/>
+        </a:gradFill>
+      </a:fillStyleLst>
+      <a:lnStyleLst>
+        <a:ln w="9525" cap="flat" cmpd="sng" algn="ctr">
+          <a:solidFill>
+            <a:schemeClr val="phClr">
+              <a:shade val="95000"/>
+              <a:satMod val="105000"/>
+            </a:schemeClr>
+          </a:solidFill>
+          <a:prstDash val="solid"/>
+        </a:ln>
+        <a:ln w="25400" cap="flat" cmpd="sng" algn="ctr">
+          <a:solidFill>
+            <a:schemeClr val="phClr"/>
+          </a:solidFill>
+          <a:prstDash val="solid"/>
+        </a:ln>
+        <a:ln w="38100" cap="flat" cmpd="sng" algn="ctr">
+          <a:solidFill>
+            <a:schemeClr val="phClr"/>
+          </a:solidFill>
+          <a:prstDash val="solid"/>
+        </a:ln>
+      </a:lnStyleLst>
+      <a:effectStyleLst>
+        <a:effectStyle>
+          <a:effectLst>
+            <a:outerShdw blurRad="40000" dist="20000" dir="5400000" rotWithShape="0">
+              <a:srgbClr val="000000">
+                <a:alpha val="38000"/>
+              </a:srgbClr>
+            </a:outerShdw>
+          </a:effectLst>
+        </a:effectStyle>
+        <a:effectStyle>
+          <a:effectLst>
+            <a:outerShdw blurRad="40000" dist="23000" dir="5400000" rotWithShape="0">
+              <a:srgbClr val="000000">
+                <a:alpha val="35000"/>
+              </a:srgbClr>
+            </a:outerShdw>
+          </a:effectLst>
+        </a:effectStyle>
+        <a:effectStyle>
+          <a:effectLst>
+            <a:outerShdw blurRad="40000" dist="23000" dir="5400000" rotWithShape="0">
+              <a:srgbClr val="000000">
+                <a:alpha val="35000"/>
+              </a:srgbClr>
+            </a:outerShdw>
+          </a:effectLst>
+          <a:scene3d>
+            <a:camera prst="orthographicFront">
+              <a:rot lat="0" lon="0" rev="0"/>
+            </a:camera>
+            <a:lightRig rig="threePt" dir="t">
+              <a:rot lat="0" lon="0" rev="1200000"/>
+            </a:lightRig>
+          </a:scene3d>
+          <a:sp3d>
+            <a:bevelT w="63500" h="25400"/>
+          </a:sp3d>
+        </a:effectStyle>
+      </a:effectStyleLst>
+      <a:bgFillStyleLst>
+        <a:solidFill>
+          <a:schemeClr val="phClr"/>
+        </a:solidFill>
+        <a:gradFill rotWithShape="1">
+          <a:gsLst>
+            <a:gs pos="0">
+              <a:schemeClr val="phClr">
+                <a:tint val="40000"/>
+                <a:satMod val="350000"/>
+              </a:schemeClr>
+            </a:gs>
+            <a:gs pos="40000">
+              <a:schemeClr val="phClr">
+                <a:tint val="45000"/>
+                <a:shade val="99000"/>
+                <a:satMod val="350000"/>
+              </a:schemeClr>
+            </a:gs>
+            <a:gs pos="100000">
+              <a:schemeClr val="phClr">
+                <a:shade val="20000"/>
+                <a:satMod val="255000"/>
+              </a:schemeClr>
+            </a:gs>
+          </a:gsLst>
+          <a:path path="circle">
+            <a:fillToRect l="50000" t="-80000" r="50000" b="180000"/>
+          </a:path>
+        </a:gradFill>
+        <a:gradFill rotWithShape="1">
+          <a:gsLst>
+            <a:gs pos="0">
+              <a:schemeClr val="phClr">
+                <a:tint val="80000"/>
+                <a:satMod val="300000"/>
+              </a:schemeClr>
+            </a:gs>
+            <a:gs pos="100000">
+              <a:schemeClr val="phClr">
+                <a:shade val="30000"/>
+                <a:satMod val="200000"/>
+              </a:schemeClr>
+            </a:gs>
+          </a:gsLst>
+          <a:path path="circle">
+            <a:fillToRect l="50000" t="50000" r="50000" b="50000"/>
+          </a:path>
+        </a:gradFill>
+      </a:bgFillStyleLst>
+    </a:fmtScheme>
+  </a:themeElements>
+</a:theme>
+</file>
+
+<file path=ppt/theme/theme2.xml><?xml version="1.0" encoding="utf-8"?>
 <a:theme xmlns:a="http://schemas.openxmlformats.org/drawingml/2006/main" xmlns:r="http://schemas.openxmlformats.org/officeDocument/2006/relationships" name="Custom Theme">
   <a:themeElements>
     <a:clrScheme name="Default">
@@ -5796,283 +6959,4 @@
     </a:fmtScheme>
   </a:themeElements>
 </a:theme>
-</file>
-
-<file path=ppt/theme/theme2.xml><?xml version="1.0" encoding="utf-8"?>
-<a:theme xmlns:a="http://schemas.openxmlformats.org/drawingml/2006/main" xmlns:r="http://schemas.openxmlformats.org/officeDocument/2006/relationships" name="simple-dark-2">
-  <a:themeElements>
-    <a:clrScheme name="Simple Dark">
-      <a:dk1>
-        <a:srgbClr val="FFFFFF"/>
-      </a:dk1>
-      <a:lt1>
-        <a:srgbClr val="212121"/>
-      </a:lt1>
-      <a:dk2>
-        <a:srgbClr val="303030"/>
-      </a:dk2>
-      <a:lt2>
-        <a:srgbClr val="ADADAD"/>
-      </a:lt2>
-      <a:accent1>
-        <a:srgbClr val="009688"/>
-      </a:accent1>
-      <a:accent2>
-        <a:srgbClr val="EEEEEE"/>
-      </a:accent2>
-      <a:accent3>
-        <a:srgbClr val="78909C"/>
-      </a:accent3>
-      <a:accent4>
-        <a:srgbClr val="FFAB40"/>
-      </a:accent4>
-      <a:accent5>
-        <a:srgbClr val="4DD0E1"/>
-      </a:accent5>
-      <a:accent6>
-        <a:srgbClr val="EEFF41"/>
-      </a:accent6>
-      <a:hlink>
-        <a:srgbClr val="4DD0E1"/>
-      </a:hlink>
-      <a:folHlink>
-        <a:srgbClr val="4DD0E1"/>
-      </a:folHlink>
-    </a:clrScheme>
-    <a:fontScheme name="Office">
-      <a:majorFont>
-        <a:latin typeface="Arial"/>
-        <a:ea typeface=""/>
-        <a:cs typeface=""/>
-        <a:font script="Jpan" typeface="ＭＳ Ｐゴシック"/>
-        <a:font script="Hang" typeface="맑은 고딕"/>
-        <a:font script="Hans" typeface="宋体"/>
-        <a:font script="Hant" typeface="新細明體"/>
-        <a:font script="Arab" typeface="Times New Roman"/>
-        <a:font script="Hebr" typeface="Times New Roman"/>
-        <a:font script="Thai" typeface="Angsana New"/>
-        <a:font script="Ethi" typeface="Nyala"/>
-        <a:font script="Beng" typeface="Vrinda"/>
-        <a:font script="Gujr" typeface="Shruti"/>
-        <a:font script="Khmr" typeface="MoolBoran"/>
-        <a:font script="Knda" typeface="Tunga"/>
-        <a:font script="Guru" typeface="Raavi"/>
-        <a:font script="Cans" typeface="Euphemia"/>
-        <a:font script="Cher" typeface="Plantagenet Cherokee"/>
-        <a:font script="Yiii" typeface="Microsoft Yi Baiti"/>
-        <a:font script="Tibt" typeface="Microsoft Himalaya"/>
-        <a:font script="Thaa" typeface="MV Boli"/>
-        <a:font script="Deva" typeface="Mangal"/>
-        <a:font script="Telu" typeface="Gautami"/>
-        <a:font script="Taml" typeface="Latha"/>
-        <a:font script="Syrc" typeface="Estrangelo Edessa"/>
-        <a:font script="Orya" typeface="Kalinga"/>
-        <a:font script="Mlym" typeface="Kartika"/>
-        <a:font script="Laoo" typeface="DokChampa"/>
-        <a:font script="Sinh" typeface="Iskoola Pota"/>
-        <a:font script="Mong" typeface="Mongolian Baiti"/>
-        <a:font script="Viet" typeface="Times New Roman"/>
-        <a:font script="Uigh" typeface="Microsoft Uighur"/>
-        <a:font script="Geor" typeface="Sylfaen"/>
-      </a:majorFont>
-      <a:minorFont>
-        <a:latin typeface="Arial"/>
-        <a:ea typeface=""/>
-        <a:cs typeface=""/>
-        <a:font script="Jpan" typeface="ＭＳ Ｐゴシック"/>
-        <a:font script="Hang" typeface="맑은 고딕"/>
-        <a:font script="Hans" typeface="宋体"/>
-        <a:font script="Hant" typeface="新細明體"/>
-        <a:font script="Arab" typeface="Arial"/>
-        <a:font script="Hebr" typeface="Arial"/>
-        <a:font script="Thai" typeface="Cordia New"/>
-        <a:font script="Ethi" typeface="Nyala"/>
-        <a:font script="Beng" typeface="Vrinda"/>
-        <a:font script="Gujr" typeface="Shruti"/>
-        <a:font script="Khmr" typeface="DaunPenh"/>
-        <a:font script="Knda" typeface="Tunga"/>
-        <a:font script="Guru" typeface="Raavi"/>
-        <a:font script="Cans" typeface="Euphemia"/>
-        <a:font script="Cher" typeface="Plantagenet Cherokee"/>
-        <a:font script="Yiii" typeface="Microsoft Yi Baiti"/>
-        <a:font script="Tibt" typeface="Microsoft Himalaya"/>
-        <a:font script="Thaa" typeface="MV Boli"/>
-        <a:font script="Deva" typeface="Mangal"/>
-        <a:font script="Telu" typeface="Gautami"/>
-        <a:font script="Taml" typeface="Latha"/>
-        <a:font script="Syrc" typeface="Estrangelo Edessa"/>
-        <a:font script="Orya" typeface="Kalinga"/>
-        <a:font script="Mlym" typeface="Kartika"/>
-        <a:font script="Laoo" typeface="DokChampa"/>
-        <a:font script="Sinh" typeface="Iskoola Pota"/>
-        <a:font script="Mong" typeface="Mongolian Baiti"/>
-        <a:font script="Viet" typeface="Arial"/>
-        <a:font script="Uigh" typeface="Microsoft Uighur"/>
-        <a:font script="Geor" typeface="Sylfaen"/>
-      </a:minorFont>
-    </a:fontScheme>
-    <a:fmtScheme name="Office">
-      <a:fillStyleLst>
-        <a:solidFill>
-          <a:schemeClr val="phClr"/>
-        </a:solidFill>
-        <a:gradFill rotWithShape="1">
-          <a:gsLst>
-            <a:gs pos="0">
-              <a:schemeClr val="phClr">
-                <a:tint val="50000"/>
-                <a:satMod val="300000"/>
-              </a:schemeClr>
-            </a:gs>
-            <a:gs pos="35000">
-              <a:schemeClr val="phClr">
-                <a:tint val="37000"/>
-                <a:satMod val="300000"/>
-              </a:schemeClr>
-            </a:gs>
-            <a:gs pos="100000">
-              <a:schemeClr val="phClr">
-                <a:tint val="15000"/>
-                <a:satMod val="350000"/>
-              </a:schemeClr>
-            </a:gs>
-          </a:gsLst>
-          <a:lin ang="16200000" scaled="1"/>
-        </a:gradFill>
-        <a:gradFill rotWithShape="1">
-          <a:gsLst>
-            <a:gs pos="0">
-              <a:schemeClr val="phClr">
-                <a:tint val="100000"/>
-                <a:shade val="100000"/>
-                <a:satMod val="130000"/>
-              </a:schemeClr>
-            </a:gs>
-            <a:gs pos="100000">
-              <a:schemeClr val="phClr">
-                <a:tint val="50000"/>
-                <a:shade val="100000"/>
-                <a:satMod val="350000"/>
-              </a:schemeClr>
-            </a:gs>
-          </a:gsLst>
-          <a:lin ang="16200000" scaled="0"/>
-        </a:gradFill>
-      </a:fillStyleLst>
-      <a:lnStyleLst>
-        <a:ln w="9525" cap="flat" cmpd="sng" algn="ctr">
-          <a:solidFill>
-            <a:schemeClr val="phClr">
-              <a:shade val="95000"/>
-              <a:satMod val="105000"/>
-            </a:schemeClr>
-          </a:solidFill>
-          <a:prstDash val="solid"/>
-        </a:ln>
-        <a:ln w="25400" cap="flat" cmpd="sng" algn="ctr">
-          <a:solidFill>
-            <a:schemeClr val="phClr"/>
-          </a:solidFill>
-          <a:prstDash val="solid"/>
-        </a:ln>
-        <a:ln w="38100" cap="flat" cmpd="sng" algn="ctr">
-          <a:solidFill>
-            <a:schemeClr val="phClr"/>
-          </a:solidFill>
-          <a:prstDash val="solid"/>
-        </a:ln>
-      </a:lnStyleLst>
-      <a:effectStyleLst>
-        <a:effectStyle>
-          <a:effectLst>
-            <a:outerShdw blurRad="40000" dist="20000" dir="5400000" rotWithShape="0">
-              <a:srgbClr val="000000">
-                <a:alpha val="38000"/>
-              </a:srgbClr>
-            </a:outerShdw>
-          </a:effectLst>
-        </a:effectStyle>
-        <a:effectStyle>
-          <a:effectLst>
-            <a:outerShdw blurRad="40000" dist="23000" dir="5400000" rotWithShape="0">
-              <a:srgbClr val="000000">
-                <a:alpha val="35000"/>
-              </a:srgbClr>
-            </a:outerShdw>
-          </a:effectLst>
-        </a:effectStyle>
-        <a:effectStyle>
-          <a:effectLst>
-            <a:outerShdw blurRad="40000" dist="23000" dir="5400000" rotWithShape="0">
-              <a:srgbClr val="000000">
-                <a:alpha val="35000"/>
-              </a:srgbClr>
-            </a:outerShdw>
-          </a:effectLst>
-          <a:scene3d>
-            <a:camera prst="orthographicFront">
-              <a:rot lat="0" lon="0" rev="0"/>
-            </a:camera>
-            <a:lightRig rig="threePt" dir="t">
-              <a:rot lat="0" lon="0" rev="1200000"/>
-            </a:lightRig>
-          </a:scene3d>
-          <a:sp3d>
-            <a:bevelT w="63500" h="25400"/>
-          </a:sp3d>
-        </a:effectStyle>
-      </a:effectStyleLst>
-      <a:bgFillStyleLst>
-        <a:solidFill>
-          <a:schemeClr val="phClr"/>
-        </a:solidFill>
-        <a:gradFill rotWithShape="1">
-          <a:gsLst>
-            <a:gs pos="0">
-              <a:schemeClr val="phClr">
-                <a:tint val="40000"/>
-                <a:satMod val="350000"/>
-              </a:schemeClr>
-            </a:gs>
-            <a:gs pos="40000">
-              <a:schemeClr val="phClr">
-                <a:tint val="45000"/>
-                <a:shade val="99000"/>
-                <a:satMod val="350000"/>
-              </a:schemeClr>
-            </a:gs>
-            <a:gs pos="100000">
-              <a:schemeClr val="phClr">
-                <a:shade val="20000"/>
-                <a:satMod val="255000"/>
-              </a:schemeClr>
-            </a:gs>
-          </a:gsLst>
-          <a:path path="circle">
-            <a:fillToRect l="50000" t="-80000" r="50000" b="180000"/>
-          </a:path>
-        </a:gradFill>
-        <a:gradFill rotWithShape="1">
-          <a:gsLst>
-            <a:gs pos="0">
-              <a:schemeClr val="phClr">
-                <a:tint val="80000"/>
-                <a:satMod val="300000"/>
-              </a:schemeClr>
-            </a:gs>
-            <a:gs pos="100000">
-              <a:schemeClr val="phClr">
-                <a:shade val="30000"/>
-                <a:satMod val="200000"/>
-              </a:schemeClr>
-            </a:gs>
-          </a:gsLst>
-          <a:path path="circle">
-            <a:fillToRect l="50000" t="50000" r="50000" b="50000"/>
-          </a:path>
-        </a:gradFill>
-      </a:bgFillStyleLst>
-    </a:fmtScheme>
-  </a:themeElements>
-</a:theme>
 </file>
</xml_diff>